<commit_message>
Minor changes in Bai 1
</commit_message>
<xml_diff>
--- a/Bai 1 Cac khai niem co ban.pptx
+++ b/Bai 1 Cac khai niem co ban.pptx
@@ -166,6 +166,22 @@
       </a:defRPr>
     </a:lvl9pPr>
   </p:defaultTextStyle>
+  <p:extLst>
+    <p:ext uri="{EFAFB233-063F-42B5-8137-9DF3F51BA10A}">
+      <p15:sldGuideLst xmlns:p15="http://schemas.microsoft.com/office/powerpoint/2012/main">
+        <p15:guide id="1" orient="horz" pos="2160">
+          <p15:clr>
+            <a:srgbClr val="A4A3A4"/>
+          </p15:clr>
+        </p15:guide>
+        <p15:guide id="2" pos="2880">
+          <p15:clr>
+            <a:srgbClr val="A4A3A4"/>
+          </p15:clr>
+        </p15:guide>
+      </p15:sldGuideLst>
+    </p:ext>
+  </p:extLst>
 </p:presentation>
 </file>
 
@@ -267,7 +283,7 @@
               <a:pPr>
                 <a:defRPr/>
               </a:pPr>
-              <a:t>28/11/2017</a:t>
+              <a:t>02/09/2018</a:t>
             </a:fld>
             <a:endParaRPr lang="vi-VN"/>
           </a:p>
@@ -9047,7 +9063,7 @@
         <p:spPr bwMode="auto">
           <a:xfrm>
             <a:off x="107950" y="6397625"/>
-            <a:ext cx="4073525" cy="368300"/>
+            <a:ext cx="4392042" cy="369332"/>
           </a:xfrm>
           <a:prstGeom prst="rect">
             <a:avLst/>
@@ -9077,7 +9093,7 @@
           </a:extLst>
         </p:spPr>
         <p:txBody>
-          <a:bodyPr>
+          <a:bodyPr wrap="square">
             <a:spAutoFit/>
           </a:bodyPr>
           <a:lstStyle>
@@ -9189,9 +9205,282 @@
           </a:lstStyle>
           <a:p>
             <a:r>
-              <a:rPr lang="en-US" altLang="vi-VN" sz="900"/>
-              <a:t>*Sau khi nhận kết quả tìm kiếm, nhu cầu thông tin của người dùng chịu tác động của kết quả tìm kiếm, sau đó người dùng có thể thiết lập lại truy vấn.</a:t>
-            </a:r>
+              <a:rPr lang="en-US" altLang="en-US" sz="900" dirty="0"/>
+              <a:t>*</a:t>
+            </a:r>
+            <a:r>
+              <a:rPr lang="en-US" altLang="en-US" sz="900" dirty="0" err="1"/>
+              <a:t>Sau</a:t>
+            </a:r>
+            <a:r>
+              <a:rPr lang="en-US" altLang="en-US" sz="900" dirty="0"/>
+              <a:t> </a:t>
+            </a:r>
+            <a:r>
+              <a:rPr lang="en-US" altLang="en-US" sz="900" dirty="0" err="1"/>
+              <a:t>khi</a:t>
+            </a:r>
+            <a:r>
+              <a:rPr lang="en-US" altLang="en-US" sz="900" dirty="0"/>
+              <a:t> </a:t>
+            </a:r>
+            <a:r>
+              <a:rPr lang="en-US" altLang="en-US" sz="900" dirty="0" err="1"/>
+              <a:t>nhận</a:t>
+            </a:r>
+            <a:r>
+              <a:rPr lang="en-US" altLang="en-US" sz="900" dirty="0"/>
+              <a:t> </a:t>
+            </a:r>
+            <a:r>
+              <a:rPr lang="en-US" altLang="en-US" sz="900" dirty="0" err="1"/>
+              <a:t>kết</a:t>
+            </a:r>
+            <a:r>
+              <a:rPr lang="en-US" altLang="en-US" sz="900" dirty="0"/>
+              <a:t> </a:t>
+            </a:r>
+            <a:r>
+              <a:rPr lang="en-US" altLang="en-US" sz="900" dirty="0" err="1"/>
+              <a:t>quả</a:t>
+            </a:r>
+            <a:r>
+              <a:rPr lang="en-US" altLang="en-US" sz="900" dirty="0"/>
+              <a:t> </a:t>
+            </a:r>
+            <a:r>
+              <a:rPr lang="en-US" altLang="en-US" sz="900" dirty="0" err="1"/>
+              <a:t>tìm</a:t>
+            </a:r>
+            <a:r>
+              <a:rPr lang="en-US" altLang="en-US" sz="900" dirty="0"/>
+              <a:t> </a:t>
+            </a:r>
+            <a:r>
+              <a:rPr lang="en-US" altLang="en-US" sz="900" dirty="0" err="1"/>
+              <a:t>kiếm</a:t>
+            </a:r>
+            <a:r>
+              <a:rPr lang="en-US" altLang="en-US" sz="900" dirty="0"/>
+              <a:t>, </a:t>
+            </a:r>
+            <a:r>
+              <a:rPr lang="en-US" altLang="en-US" sz="900" dirty="0" err="1"/>
+              <a:t>người</a:t>
+            </a:r>
+            <a:r>
+              <a:rPr lang="en-US" altLang="en-US" sz="900" dirty="0"/>
+              <a:t> </a:t>
+            </a:r>
+            <a:r>
+              <a:rPr lang="en-US" altLang="en-US" sz="900" dirty="0" err="1"/>
+              <a:t>dùng</a:t>
+            </a:r>
+            <a:r>
+              <a:rPr lang="en-US" altLang="en-US" sz="900" dirty="0"/>
+              <a:t> </a:t>
+            </a:r>
+            <a:r>
+              <a:rPr lang="en-US" altLang="en-US" sz="900" dirty="0" err="1"/>
+              <a:t>chịu</a:t>
+            </a:r>
+            <a:r>
+              <a:rPr lang="en-US" altLang="en-US" sz="900" dirty="0"/>
+              <a:t> </a:t>
+            </a:r>
+            <a:r>
+              <a:rPr lang="en-US" altLang="en-US" sz="900" dirty="0" err="1"/>
+              <a:t>tác</a:t>
+            </a:r>
+            <a:r>
+              <a:rPr lang="en-US" altLang="en-US" sz="900" dirty="0"/>
+              <a:t> </a:t>
+            </a:r>
+            <a:r>
+              <a:rPr lang="en-US" altLang="en-US" sz="900" dirty="0" err="1"/>
+              <a:t>động</a:t>
+            </a:r>
+            <a:r>
+              <a:rPr lang="en-US" altLang="en-US" sz="900" dirty="0"/>
+              <a:t> </a:t>
+            </a:r>
+            <a:r>
+              <a:rPr lang="en-US" altLang="en-US" sz="900" dirty="0" err="1"/>
+              <a:t>của</a:t>
+            </a:r>
+            <a:r>
+              <a:rPr lang="en-US" altLang="en-US" sz="900" dirty="0"/>
+              <a:t> </a:t>
+            </a:r>
+            <a:r>
+              <a:rPr lang="en-US" altLang="en-US" sz="900" dirty="0" err="1"/>
+              <a:t>kết</a:t>
+            </a:r>
+            <a:r>
+              <a:rPr lang="en-US" altLang="en-US" sz="900" dirty="0"/>
+              <a:t> </a:t>
+            </a:r>
+            <a:r>
+              <a:rPr lang="en-US" altLang="en-US" sz="900" dirty="0" err="1"/>
+              <a:t>quả</a:t>
+            </a:r>
+            <a:r>
+              <a:rPr lang="en-US" altLang="en-US" sz="900" dirty="0"/>
+              <a:t> </a:t>
+            </a:r>
+            <a:r>
+              <a:rPr lang="en-US" altLang="en-US" sz="900" dirty="0" err="1"/>
+              <a:t>tìm</a:t>
+            </a:r>
+            <a:r>
+              <a:rPr lang="en-US" altLang="en-US" sz="900" dirty="0"/>
+              <a:t> </a:t>
+            </a:r>
+            <a:r>
+              <a:rPr lang="en-US" altLang="en-US" sz="900" dirty="0" err="1"/>
+              <a:t>kiếm</a:t>
+            </a:r>
+            <a:r>
+              <a:rPr lang="en-US" altLang="en-US" sz="900" dirty="0"/>
+              <a:t> </a:t>
+            </a:r>
+            <a:r>
+              <a:rPr lang="en-US" altLang="en-US" sz="900" dirty="0" err="1"/>
+              <a:t>và</a:t>
+            </a:r>
+            <a:r>
+              <a:rPr lang="en-US" altLang="en-US" sz="900" dirty="0"/>
+              <a:t> </a:t>
+            </a:r>
+            <a:r>
+              <a:rPr lang="en-US" altLang="en-US" sz="900" dirty="0" err="1"/>
+              <a:t>có</a:t>
+            </a:r>
+            <a:r>
+              <a:rPr lang="en-US" altLang="en-US" sz="900" dirty="0"/>
+              <a:t> </a:t>
+            </a:r>
+            <a:r>
+              <a:rPr lang="en-US" altLang="en-US" sz="900" dirty="0" err="1"/>
+              <a:t>thể</a:t>
+            </a:r>
+            <a:r>
+              <a:rPr lang="en-US" altLang="en-US" sz="900" dirty="0"/>
+              <a:t> </a:t>
+            </a:r>
+            <a:r>
+              <a:rPr lang="en-US" altLang="en-US" sz="900" dirty="0" err="1"/>
+              <a:t>dẫn</a:t>
+            </a:r>
+            <a:r>
+              <a:rPr lang="en-US" altLang="en-US" sz="900" dirty="0"/>
+              <a:t> </a:t>
+            </a:r>
+            <a:r>
+              <a:rPr lang="en-US" altLang="en-US" sz="900" dirty="0" err="1"/>
+              <a:t>đến</a:t>
+            </a:r>
+            <a:r>
+              <a:rPr lang="en-US" altLang="en-US" sz="900" dirty="0"/>
+              <a:t> </a:t>
+            </a:r>
+            <a:r>
+              <a:rPr lang="en-US" altLang="en-US" sz="900" dirty="0" err="1"/>
+              <a:t>thay</a:t>
+            </a:r>
+            <a:r>
+              <a:rPr lang="en-US" altLang="en-US" sz="900" dirty="0"/>
+              <a:t> </a:t>
+            </a:r>
+            <a:r>
+              <a:rPr lang="en-US" altLang="en-US" sz="900" dirty="0" err="1"/>
+              <a:t>đổi</a:t>
+            </a:r>
+            <a:r>
+              <a:rPr lang="en-US" altLang="en-US" sz="900" dirty="0"/>
+              <a:t> </a:t>
+            </a:r>
+            <a:r>
+              <a:rPr lang="en-US" altLang="en-US" sz="900" dirty="0" err="1"/>
+              <a:t>nhu</a:t>
+            </a:r>
+            <a:r>
+              <a:rPr lang="en-US" altLang="en-US" sz="900" dirty="0"/>
+              <a:t> </a:t>
+            </a:r>
+            <a:r>
+              <a:rPr lang="en-US" altLang="en-US" sz="900" dirty="0" err="1"/>
+              <a:t>cầu</a:t>
+            </a:r>
+            <a:r>
+              <a:rPr lang="en-US" altLang="en-US" sz="900" dirty="0"/>
+              <a:t> </a:t>
+            </a:r>
+            <a:r>
+              <a:rPr lang="en-US" altLang="en-US" sz="900" dirty="0" err="1"/>
+              <a:t>thông</a:t>
+            </a:r>
+            <a:r>
+              <a:rPr lang="en-US" altLang="en-US" sz="900" dirty="0"/>
+              <a:t> tin </a:t>
+            </a:r>
+            <a:r>
+              <a:rPr lang="en-US" altLang="en-US" sz="900" dirty="0" err="1"/>
+              <a:t>sau</a:t>
+            </a:r>
+            <a:r>
+              <a:rPr lang="en-US" altLang="en-US" sz="900" dirty="0"/>
+              <a:t> </a:t>
+            </a:r>
+            <a:r>
+              <a:rPr lang="en-US" altLang="en-US" sz="900" dirty="0" err="1"/>
+              <a:t>đó</a:t>
+            </a:r>
+            <a:r>
+              <a:rPr lang="en-US" altLang="en-US" sz="900" dirty="0"/>
+              <a:t> </a:t>
+            </a:r>
+            <a:r>
+              <a:rPr lang="en-US" altLang="en-US" sz="900" dirty="0" err="1"/>
+              <a:t>thiết</a:t>
+            </a:r>
+            <a:r>
+              <a:rPr lang="en-US" altLang="en-US" sz="900" dirty="0"/>
+              <a:t> </a:t>
+            </a:r>
+            <a:r>
+              <a:rPr lang="en-US" altLang="en-US" sz="900" dirty="0" err="1"/>
+              <a:t>lập</a:t>
+            </a:r>
+            <a:r>
+              <a:rPr lang="en-US" altLang="en-US" sz="900" dirty="0"/>
+              <a:t> </a:t>
+            </a:r>
+            <a:r>
+              <a:rPr lang="en-US" altLang="en-US" sz="900" dirty="0" err="1"/>
+              <a:t>lại</a:t>
+            </a:r>
+            <a:r>
+              <a:rPr lang="en-US" altLang="en-US" sz="900" dirty="0"/>
+              <a:t> </a:t>
+            </a:r>
+            <a:r>
+              <a:rPr lang="en-US" altLang="en-US" sz="900" dirty="0" err="1"/>
+              <a:t>truy</a:t>
+            </a:r>
+            <a:r>
+              <a:rPr lang="en-US" altLang="en-US" sz="900" dirty="0"/>
+              <a:t> </a:t>
+            </a:r>
+            <a:r>
+              <a:rPr lang="en-US" altLang="en-US" sz="900" dirty="0" err="1"/>
+              <a:t>vấn</a:t>
+            </a:r>
+            <a:r>
+              <a:rPr lang="en-US" altLang="en-US" sz="900" dirty="0"/>
+              <a:t>.</a:t>
+            </a:r>
+            <a:endParaRPr lang="en-US" altLang="en-US" sz="900" dirty="0"/>
           </a:p>
         </p:txBody>
       </p:sp>
@@ -13627,7 +13916,55 @@
               <a:rPr lang="vi-VN" altLang="ru-RU" sz="2000" dirty="0">
                 <a:cs typeface="Tahoma" pitchFamily="34" charset="0"/>
               </a:rPr>
-              <a:t>Mỗi mục từ trong bộ từ vựng là một bộ ba gồm một từ duy nhất, df và con trỏ tới danh sách thẻ định vị của từ đó;</a:t>
+              <a:t>Mỗi mục từ </a:t>
+            </a:r>
+            <a:r>
+              <a:rPr lang="vi-VN" altLang="ru-RU" sz="2000" dirty="0" smtClean="0">
+                <a:cs typeface="Tahoma" pitchFamily="34" charset="0"/>
+              </a:rPr>
+              <a:t>là </a:t>
+            </a:r>
+            <a:r>
+              <a:rPr lang="vi-VN" altLang="ru-RU" sz="2000" dirty="0">
+                <a:cs typeface="Tahoma" pitchFamily="34" charset="0"/>
+              </a:rPr>
+              <a:t>một bộ ba gồm một từ duy </a:t>
+            </a:r>
+            <a:r>
+              <a:rPr lang="vi-VN" altLang="ru-RU" sz="2000" dirty="0" smtClean="0">
+                <a:cs typeface="Tahoma" pitchFamily="34" charset="0"/>
+              </a:rPr>
+              <a:t>nhất</a:t>
+            </a:r>
+            <a:r>
+              <a:rPr lang="en-US" altLang="ru-RU" sz="2000" dirty="0" smtClean="0">
+                <a:cs typeface="Tahoma" pitchFamily="34" charset="0"/>
+              </a:rPr>
+              <a:t> </a:t>
+            </a:r>
+            <a:r>
+              <a:rPr lang="vi-VN" altLang="ru-RU" sz="2000" dirty="0">
+                <a:cs typeface="Tahoma" pitchFamily="34" charset="0"/>
+              </a:rPr>
+              <a:t>trong bộ từ </a:t>
+            </a:r>
+            <a:r>
+              <a:rPr lang="vi-VN" altLang="ru-RU" sz="2000" dirty="0" smtClean="0">
+                <a:cs typeface="Tahoma" pitchFamily="34" charset="0"/>
+              </a:rPr>
+              <a:t>vựng, </a:t>
+            </a:r>
+            <a:r>
+              <a:rPr lang="vi-VN" altLang="ru-RU" sz="2000" i="1" dirty="0">
+                <a:cs typeface="Tahoma" pitchFamily="34" charset="0"/>
+              </a:rPr>
+              <a:t>df</a:t>
+            </a:r>
+            <a:r>
+              <a:rPr lang="vi-VN" altLang="ru-RU" sz="2000" dirty="0">
+                <a:cs typeface="Tahoma" pitchFamily="34" charset="0"/>
+              </a:rPr>
+              <a:t> và con trỏ tới danh sách thẻ định vị của từ đó;</a:t>
             </a:r>
           </a:p>
           <a:p>
@@ -13650,7 +13987,19 @@
               <a:rPr lang="vi-VN" altLang="ru-RU" sz="2000" dirty="0">
                 <a:cs typeface="Tahoma" pitchFamily="34" charset="0"/>
               </a:rPr>
-              <a:t>Thẻ định vị, là một cấu trúc lưu thông tin ứng với một văn bản (mã văn bản, các vị trí xuất hiện từ, v.v.). Từ định vị mang ý nghĩa xác định vị trí xuất hiện của từ;</a:t>
+              <a:t>Thẻ định vị, là một cấu trúc lưu thông tin </a:t>
+            </a:r>
+            <a:r>
+              <a:rPr lang="vi-VN" altLang="ru-RU" sz="2000" dirty="0">
+                <a:cs typeface="Tahoma" pitchFamily="34" charset="0"/>
+              </a:rPr>
+              <a:t>tương ứng </a:t>
+            </a:r>
+            <a:r>
+              <a:rPr lang="vi-VN" altLang="ru-RU" sz="2000" dirty="0">
+                <a:cs typeface="Tahoma" pitchFamily="34" charset="0"/>
+              </a:rPr>
+              <a:t>với một văn bản (mã văn bản, các vị trí xuất hiện từ, v.v.). Từ định vị mang ý nghĩa xác định vị trí xuất hiện của từ;</a:t>
             </a:r>
           </a:p>
           <a:p>
@@ -13673,7 +14022,31 @@
               <a:rPr lang="vi-VN" altLang="ru-RU" sz="2000" dirty="0">
                 <a:cs typeface="Tahoma" pitchFamily="34" charset="0"/>
               </a:rPr>
-              <a:t>Tất cả các thẻ định trong các danh sách thẻ định vị gộp lại được gọi chung là bộ thẻ định vị.</a:t>
+              <a:t>Tất </a:t>
+            </a:r>
+            <a:r>
+              <a:rPr lang="vi-VN" altLang="ru-RU" sz="2000" dirty="0" smtClean="0">
+                <a:cs typeface="Tahoma" pitchFamily="34" charset="0"/>
+              </a:rPr>
+              <a:t>cả</a:t>
+            </a:r>
+            <a:r>
+              <a:rPr lang="en-US" altLang="ru-RU" sz="2000" dirty="0" smtClean="0">
+                <a:cs typeface="Tahoma" pitchFamily="34" charset="0"/>
+              </a:rPr>
+              <a:t> </a:t>
+            </a:r>
+            <a:r>
+              <a:rPr lang="vi-VN" altLang="ru-RU" sz="2000" dirty="0" smtClean="0">
+                <a:cs typeface="Tahoma" pitchFamily="34" charset="0"/>
+              </a:rPr>
+              <a:t>các </a:t>
+            </a:r>
+            <a:r>
+              <a:rPr lang="vi-VN" altLang="ru-RU" sz="2000" dirty="0">
+                <a:cs typeface="Tahoma" pitchFamily="34" charset="0"/>
+              </a:rPr>
+              <a:t>danh sách thẻ định vị gộp lại được gọi chung là bộ thẻ định vị.</a:t>
             </a:r>
           </a:p>
         </p:txBody>
@@ -21545,27 +21918,43 @@
           <a:p>
             <a:pPr algn="just" eaLnBrk="1" hangingPunct="1"/>
             <a:r>
-              <a:rPr lang="vi-VN" altLang="ru-RU" sz="2400" smtClean="0"/>
+              <a:rPr lang="vi-VN" altLang="ru-RU" sz="2400" dirty="0" smtClean="0"/>
               <a:t>Bộ từ vựng và bộ thẻ định vị thường được lưu tách biệt</a:t>
             </a:r>
           </a:p>
           <a:p>
             <a:pPr lvl="1" algn="just" eaLnBrk="1" hangingPunct="1"/>
             <a:r>
-              <a:rPr lang="vi-VN" altLang="ru-RU" sz="1800" smtClean="0"/>
-              <a:t>Có thẻ nén bộ từ vựng và bộ thẻ định vị;</a:t>
+              <a:rPr lang="vi-VN" altLang="ru-RU" sz="1800" dirty="0" smtClean="0"/>
+              <a:t>Có </a:t>
+            </a:r>
+            <a:r>
+              <a:rPr lang="vi-VN" altLang="ru-RU" sz="1800" dirty="0"/>
+              <a:t>thể </a:t>
+            </a:r>
+            <a:r>
+              <a:rPr lang="vi-VN" altLang="ru-RU" sz="1800" dirty="0" smtClean="0"/>
+              <a:t>nén bộ từ vựng và bộ </a:t>
+            </a:r>
+            <a:r>
+              <a:rPr lang="vi-VN" altLang="ru-RU" sz="1800" dirty="0" smtClean="0"/>
+              <a:t>thẻ </a:t>
+            </a:r>
+            <a:r>
+              <a:rPr lang="vi-VN" altLang="ru-RU" sz="1800" dirty="0" smtClean="0"/>
+              <a:t>định vị;</a:t>
             </a:r>
           </a:p>
           <a:p>
             <a:pPr lvl="1" algn="just" eaLnBrk="1" hangingPunct="1"/>
             <a:r>
-              <a:rPr lang="vi-VN" altLang="ru-RU" sz="1800" smtClean="0"/>
+              <a:rPr lang="vi-VN" altLang="ru-RU" sz="1800" dirty="0" smtClean="0"/>
               <a:t>Giải thuật nén bộ từ vựng khác giải thuật nén bộ thẻ định vị.</a:t>
             </a:r>
           </a:p>
           <a:p>
             <a:pPr eaLnBrk="1" hangingPunct="1"/>
-            <a:endParaRPr lang="en-US" altLang="ru-RU" sz="2400" smtClean="0"/>
+            <a:endParaRPr lang="en-US" altLang="ru-RU" sz="2400" dirty="0" smtClean="0"/>
           </a:p>
         </p:txBody>
       </p:sp>
@@ -21782,53 +22171,125 @@
               <a:buNone/>
             </a:pPr>
             <a:r>
-              <a:rPr lang="en-US" altLang="ru-RU" sz="2800" smtClean="0"/>
-              <a:t>Cho các văn bản sau:</a:t>
+              <a:rPr lang="en-US" altLang="ru-RU" sz="2800" dirty="0" smtClean="0"/>
+              <a:t>Cho </a:t>
+            </a:r>
+            <a:r>
+              <a:rPr lang="en-US" altLang="ru-RU" sz="2800" dirty="0" err="1" smtClean="0"/>
+              <a:t>các</a:t>
+            </a:r>
+            <a:r>
+              <a:rPr lang="en-US" altLang="ru-RU" sz="2800" dirty="0" smtClean="0"/>
+              <a:t> </a:t>
+            </a:r>
+            <a:r>
+              <a:rPr lang="en-US" altLang="ru-RU" sz="2800" dirty="0" err="1" smtClean="0"/>
+              <a:t>văn</a:t>
+            </a:r>
+            <a:r>
+              <a:rPr lang="en-US" altLang="ru-RU" sz="2800" dirty="0" smtClean="0"/>
+              <a:t> </a:t>
+            </a:r>
+            <a:r>
+              <a:rPr lang="en-US" altLang="ru-RU" sz="2800" dirty="0" err="1" smtClean="0"/>
+              <a:t>bản</a:t>
+            </a:r>
+            <a:r>
+              <a:rPr lang="en-US" altLang="ru-RU" sz="2800" dirty="0" smtClean="0"/>
+              <a:t> </a:t>
+            </a:r>
+            <a:r>
+              <a:rPr lang="en-US" altLang="ru-RU" sz="2800" dirty="0" err="1" smtClean="0"/>
+              <a:t>sau</a:t>
+            </a:r>
+            <a:r>
+              <a:rPr lang="en-US" altLang="ru-RU" sz="2800" dirty="0" smtClean="0"/>
+              <a:t>:</a:t>
             </a:r>
           </a:p>
           <a:p>
             <a:pPr lvl="1" algn="just" eaLnBrk="1" hangingPunct="1"/>
             <a:r>
-              <a:rPr lang="en-US" altLang="ru-RU" sz="2400" b="1" smtClean="0"/>
-              <a:t>Doc1</a:t>
+              <a:rPr lang="en-US" altLang="ru-RU" sz="2400" b="1" dirty="0" smtClean="0"/>
+              <a:t>Doc1:</a:t>
+            </a:r>
+            <a:r>
+              <a:rPr lang="en-US" altLang="ru-RU" sz="2400" dirty="0" smtClean="0"/>
+              <a:t> [breakthrough </a:t>
+            </a:r>
+            <a:r>
+              <a:rPr lang="en-US" altLang="ru-RU" sz="2400" dirty="0" smtClean="0"/>
+              <a:t>drug </a:t>
             </a:r>
             <a:r>
               <a:rPr lang="en-US" altLang="ru-RU" sz="2400" smtClean="0"/>
-              <a:t> breakthrough drug for schizophrenia</a:t>
-            </a:r>
+              <a:t>for </a:t>
+            </a:r>
+            <a:r>
+              <a:rPr lang="en-US" altLang="ru-RU" sz="2400" smtClean="0"/>
+              <a:t>schizophrenia]</a:t>
+            </a:r>
+            <a:endParaRPr lang="en-US" altLang="ru-RU" sz="2400" dirty="0" smtClean="0"/>
           </a:p>
           <a:p>
             <a:pPr lvl="1" algn="just" eaLnBrk="1" hangingPunct="1"/>
             <a:r>
-              <a:rPr lang="en-US" altLang="ru-RU" sz="2400" b="1" smtClean="0"/>
-              <a:t>Doc2</a:t>
-            </a:r>
-            <a:r>
-              <a:rPr lang="en-US" altLang="ru-RU" sz="2400" smtClean="0"/>
-              <a:t> new schizophrenia drug</a:t>
-            </a:r>
+              <a:rPr lang="en-US" altLang="ru-RU" sz="2400" b="1" dirty="0" smtClean="0"/>
+              <a:t>Doc2:</a:t>
+            </a:r>
+            <a:r>
+              <a:rPr lang="en-US" altLang="ru-RU" sz="2400" dirty="0" smtClean="0"/>
+              <a:t> [new </a:t>
+            </a:r>
+            <a:r>
+              <a:rPr lang="en-US" altLang="ru-RU" sz="2400" dirty="0" smtClean="0"/>
+              <a:t>schizophrenia </a:t>
+            </a:r>
+            <a:r>
+              <a:rPr lang="en-US" altLang="ru-RU" sz="2400" dirty="0" smtClean="0"/>
+              <a:t>drug]</a:t>
+            </a:r>
+            <a:endParaRPr lang="en-US" altLang="ru-RU" sz="2400" dirty="0" smtClean="0"/>
           </a:p>
           <a:p>
             <a:pPr lvl="1" algn="just" eaLnBrk="1" hangingPunct="1"/>
             <a:r>
-              <a:rPr lang="en-US" altLang="ru-RU" sz="2400" b="1" smtClean="0"/>
-              <a:t>Doc3</a:t>
-            </a:r>
-            <a:r>
-              <a:rPr lang="en-US" altLang="ru-RU" sz="2400" smtClean="0"/>
-              <a:t> new approach for treatment of schizophrenia</a:t>
-            </a:r>
+              <a:rPr lang="en-US" altLang="ru-RU" sz="2400" b="1" dirty="0" smtClean="0"/>
+              <a:t>Doc3:</a:t>
+            </a:r>
+            <a:r>
+              <a:rPr lang="en-US" altLang="ru-RU" sz="2400" dirty="0" smtClean="0"/>
+              <a:t> [new </a:t>
+            </a:r>
+            <a:r>
+              <a:rPr lang="en-US" altLang="ru-RU" sz="2400" dirty="0" smtClean="0"/>
+              <a:t>approach for treatment of </a:t>
+            </a:r>
+            <a:r>
+              <a:rPr lang="en-US" altLang="ru-RU" sz="2400" dirty="0" smtClean="0"/>
+              <a:t>schizophrenia]</a:t>
+            </a:r>
+            <a:endParaRPr lang="en-US" altLang="ru-RU" sz="2400" dirty="0" smtClean="0"/>
           </a:p>
           <a:p>
             <a:pPr lvl="1" algn="just" eaLnBrk="1" hangingPunct="1"/>
             <a:r>
-              <a:rPr lang="en-US" altLang="ru-RU" sz="2400" b="1" smtClean="0"/>
-              <a:t>Doc4</a:t>
-            </a:r>
-            <a:r>
-              <a:rPr lang="en-US" altLang="ru-RU" sz="2400" smtClean="0"/>
-              <a:t> new hopes for schizophrenia patients</a:t>
-            </a:r>
+              <a:rPr lang="en-US" altLang="ru-RU" sz="2400" b="1" dirty="0" smtClean="0"/>
+              <a:t>Doc4:</a:t>
+            </a:r>
+            <a:r>
+              <a:rPr lang="en-US" altLang="ru-RU" sz="2400" dirty="0" smtClean="0"/>
+              <a:t> [new </a:t>
+            </a:r>
+            <a:r>
+              <a:rPr lang="en-US" altLang="ru-RU" sz="2400" dirty="0" smtClean="0"/>
+              <a:t>hopes for schizophrenia </a:t>
+            </a:r>
+            <a:r>
+              <a:rPr lang="en-US" altLang="ru-RU" sz="2400" dirty="0" smtClean="0"/>
+              <a:t>patients]</a:t>
+            </a:r>
+            <a:endParaRPr lang="en-US" altLang="ru-RU" sz="2400" dirty="0" smtClean="0"/>
           </a:p>
           <a:p>
             <a:pPr marL="0" indent="0" algn="just" eaLnBrk="1" hangingPunct="1">
@@ -21836,8 +22297,56 @@
               <a:buNone/>
             </a:pPr>
             <a:r>
-              <a:rPr lang="en-US" altLang="ru-RU" sz="2800" smtClean="0"/>
-              <a:t>a) Vẽ biểu diễn chỉ mục ngược;</a:t>
+              <a:rPr lang="en-US" altLang="ru-RU" sz="2800" dirty="0" smtClean="0"/>
+              <a:t>a) </a:t>
+            </a:r>
+            <a:r>
+              <a:rPr lang="en-US" altLang="ru-RU" sz="2800" dirty="0" err="1" smtClean="0"/>
+              <a:t>Vẽ</a:t>
+            </a:r>
+            <a:r>
+              <a:rPr lang="en-US" altLang="ru-RU" sz="2800" dirty="0" smtClean="0"/>
+              <a:t> </a:t>
+            </a:r>
+            <a:r>
+              <a:rPr lang="en-US" altLang="ru-RU" sz="2800" dirty="0" err="1" smtClean="0"/>
+              <a:t>biểu</a:t>
+            </a:r>
+            <a:r>
+              <a:rPr lang="en-US" altLang="ru-RU" sz="2800" dirty="0" smtClean="0"/>
+              <a:t> </a:t>
+            </a:r>
+            <a:r>
+              <a:rPr lang="en-US" altLang="ru-RU" sz="2800" dirty="0" err="1" smtClean="0"/>
+              <a:t>diễn</a:t>
+            </a:r>
+            <a:r>
+              <a:rPr lang="en-US" altLang="ru-RU" sz="2800" dirty="0" smtClean="0"/>
+              <a:t> </a:t>
+            </a:r>
+            <a:r>
+              <a:rPr lang="en-US" altLang="ru-RU" sz="2800" dirty="0" err="1" smtClean="0"/>
+              <a:t>chỉ</a:t>
+            </a:r>
+            <a:r>
+              <a:rPr lang="en-US" altLang="ru-RU" sz="2800" dirty="0" smtClean="0"/>
+              <a:t> </a:t>
+            </a:r>
+            <a:r>
+              <a:rPr lang="en-US" altLang="ru-RU" sz="2800" dirty="0" err="1" smtClean="0"/>
+              <a:t>mục</a:t>
+            </a:r>
+            <a:r>
+              <a:rPr lang="en-US" altLang="ru-RU" sz="2800" dirty="0" smtClean="0"/>
+              <a:t> </a:t>
+            </a:r>
+            <a:r>
+              <a:rPr lang="en-US" altLang="ru-RU" sz="2800" dirty="0" err="1" smtClean="0"/>
+              <a:t>ngược</a:t>
+            </a:r>
+            <a:r>
+              <a:rPr lang="en-US" altLang="ru-RU" sz="2800" dirty="0" smtClean="0"/>
+              <a:t>;</a:t>
             </a:r>
           </a:p>
           <a:p>
@@ -21846,21 +22355,109 @@
               <a:buNone/>
             </a:pPr>
             <a:r>
-              <a:rPr lang="en-US" altLang="ru-RU" sz="2800" smtClean="0"/>
-              <a:t>b) Các văn bản nào sẽ được trả về cho truy vấn: </a:t>
+              <a:rPr lang="en-US" altLang="ru-RU" sz="2800" dirty="0" smtClean="0"/>
+              <a:t>b) </a:t>
+            </a:r>
+            <a:r>
+              <a:rPr lang="en-US" altLang="ru-RU" sz="2800" dirty="0" err="1" smtClean="0"/>
+              <a:t>Các</a:t>
+            </a:r>
+            <a:r>
+              <a:rPr lang="en-US" altLang="ru-RU" sz="2800" dirty="0" smtClean="0"/>
+              <a:t> </a:t>
+            </a:r>
+            <a:r>
+              <a:rPr lang="en-US" altLang="ru-RU" sz="2800" dirty="0" err="1" smtClean="0"/>
+              <a:t>văn</a:t>
+            </a:r>
+            <a:r>
+              <a:rPr lang="en-US" altLang="ru-RU" sz="2800" dirty="0" smtClean="0"/>
+              <a:t> </a:t>
+            </a:r>
+            <a:r>
+              <a:rPr lang="en-US" altLang="ru-RU" sz="2800" dirty="0" err="1" smtClean="0"/>
+              <a:t>bản</a:t>
+            </a:r>
+            <a:r>
+              <a:rPr lang="en-US" altLang="ru-RU" sz="2800" dirty="0" smtClean="0"/>
+              <a:t> </a:t>
+            </a:r>
+            <a:r>
+              <a:rPr lang="en-US" altLang="ru-RU" sz="2800" dirty="0" err="1" smtClean="0"/>
+              <a:t>nào</a:t>
+            </a:r>
+            <a:r>
+              <a:rPr lang="en-US" altLang="ru-RU" sz="2800" dirty="0" smtClean="0"/>
+              <a:t> </a:t>
+            </a:r>
+            <a:r>
+              <a:rPr lang="en-US" altLang="ru-RU" sz="2800" dirty="0" err="1" smtClean="0"/>
+              <a:t>sẽ</a:t>
+            </a:r>
+            <a:r>
+              <a:rPr lang="en-US" altLang="ru-RU" sz="2800" dirty="0" smtClean="0"/>
+              <a:t> </a:t>
+            </a:r>
+            <a:r>
+              <a:rPr lang="en-US" altLang="ru-RU" sz="2800" dirty="0" err="1" smtClean="0"/>
+              <a:t>được</a:t>
+            </a:r>
+            <a:r>
+              <a:rPr lang="en-US" altLang="ru-RU" sz="2800" dirty="0" smtClean="0"/>
+              <a:t> </a:t>
+            </a:r>
+            <a:r>
+              <a:rPr lang="en-US" altLang="ru-RU" sz="2800" dirty="0" err="1" smtClean="0"/>
+              <a:t>trả</a:t>
+            </a:r>
+            <a:r>
+              <a:rPr lang="en-US" altLang="ru-RU" sz="2800" dirty="0" smtClean="0"/>
+              <a:t> </a:t>
+            </a:r>
+            <a:r>
+              <a:rPr lang="en-US" altLang="ru-RU" sz="2800" dirty="0" err="1" smtClean="0"/>
+              <a:t>về</a:t>
+            </a:r>
+            <a:r>
+              <a:rPr lang="en-US" altLang="ru-RU" sz="2800" dirty="0" smtClean="0"/>
+              <a:t> </a:t>
+            </a:r>
+            <a:r>
+              <a:rPr lang="en-US" altLang="ru-RU" sz="2800" dirty="0" err="1" smtClean="0"/>
+              <a:t>cho</a:t>
+            </a:r>
+            <a:r>
+              <a:rPr lang="en-US" altLang="ru-RU" sz="2800" dirty="0" smtClean="0"/>
+              <a:t> </a:t>
+            </a:r>
+            <a:r>
+              <a:rPr lang="en-US" altLang="ru-RU" sz="2800" dirty="0" err="1" smtClean="0"/>
+              <a:t>truy</a:t>
+            </a:r>
+            <a:r>
+              <a:rPr lang="en-US" altLang="ru-RU" sz="2800" dirty="0" smtClean="0"/>
+              <a:t> </a:t>
+            </a:r>
+            <a:r>
+              <a:rPr lang="en-US" altLang="ru-RU" sz="2800" dirty="0" err="1" smtClean="0"/>
+              <a:t>vấn</a:t>
+            </a:r>
+            <a:r>
+              <a:rPr lang="en-US" altLang="ru-RU" sz="2800" dirty="0" smtClean="0"/>
+              <a:t>: </a:t>
             </a:r>
           </a:p>
           <a:p>
             <a:pPr lvl="1" algn="just" eaLnBrk="1" hangingPunct="1"/>
             <a:r>
-              <a:rPr lang="en-US" altLang="ru-RU" smtClean="0"/>
+              <a:rPr lang="en-US" altLang="ru-RU" dirty="0" smtClean="0"/>
               <a:t>schizophrenia AND drug</a:t>
             </a:r>
           </a:p>
           <a:p>
             <a:pPr lvl="1" algn="just" eaLnBrk="1" hangingPunct="1"/>
             <a:r>
-              <a:rPr lang="en-US" altLang="ru-RU" smtClean="0"/>
+              <a:rPr lang="en-US" altLang="ru-RU" dirty="0" smtClean="0"/>
               <a:t>for AND NOT(drug OR approach)</a:t>
             </a:r>
           </a:p>
@@ -28716,7 +29313,7 @@
   </a:extraClrSchemeLst>
   <a:extLst>
     <a:ext uri="{05A4C25C-085E-4340-85A3-A5531E510DB2}">
-      <thm15:themeFamily xmlns="" xmlns:thm15="http://schemas.microsoft.com/office/thememl/2012/main" name="Office Theme" id="{62F939B6-93AF-4DB8-9C6B-D6C7DFDC589F}" vid="{4A3C46E8-61CC-4603-A589-7422A47A8E4A}"/>
+      <thm15:themeFamily xmlns:thm15="http://schemas.microsoft.com/office/thememl/2012/main" name="Office Theme" id="{62F939B6-93AF-4DB8-9C6B-D6C7DFDC589F}" vid="{4A3C46E8-61CC-4603-A589-7422A47A8E4A}"/>
     </a:ext>
   </a:extLst>
 </a:theme>
@@ -28977,7 +29574,7 @@
   <a:extraClrSchemeLst/>
   <a:extLst>
     <a:ext uri="{05A4C25C-085E-4340-85A3-A5531E510DB2}">
-      <thm15:themeFamily xmlns="" xmlns:thm15="http://schemas.microsoft.com/office/thememl/2012/main" name="Office Theme" id="{62F939B6-93AF-4DB8-9C6B-D6C7DFDC589F}" vid="{4A3C46E8-61CC-4603-A589-7422A47A8E4A}"/>
+      <thm15:themeFamily xmlns:thm15="http://schemas.microsoft.com/office/thememl/2012/main" name="Office Theme" id="{62F939B6-93AF-4DB8-9C6B-D6C7DFDC589F}" vid="{4A3C46E8-61CC-4603-A589-7422A47A8E4A}"/>
     </a:ext>
   </a:extLst>
 </a:theme>

</xml_diff>